<commit_message>
Update 04-2019 summary pres
Small fixes based on feedback
</commit_message>
<xml_diff>
--- a/PRESENTATIONS/wot-summary-and-roadmap-04-2019.pptx
+++ b/PRESENTATIONS/wot-summary-and-roadmap-04-2019.pptx
@@ -536,6 +536,174 @@
           <a:bodyPr/>
           <a:lstStyle/>
           <a:p>
+            <a:endParaRPr lang="en-US"/>
+          </a:p>
+        </p:txBody>
+      </p:sp>
+      <p:sp>
+        <p:nvSpPr>
+          <p:cNvPr id="4" name="Slide Number Placeholder 3"/>
+          <p:cNvSpPr>
+            <a:spLocks noGrp="1"/>
+          </p:cNvSpPr>
+          <p:nvPr>
+            <p:ph type="sldNum" sz="quarter" idx="5"/>
+          </p:nvPr>
+        </p:nvSpPr>
+        <p:spPr/>
+        <p:txBody>
+          <a:bodyPr/>
+          <a:lstStyle/>
+          <a:p>
+            <a:fld id="{9306DCE6-5E8C-4E63-B22B-AE2E83541C38}" type="slidenum">
+              <a:rPr lang="en-US" smtClean="0"/>
+              <a:t>3</a:t>
+            </a:fld>
+            <a:endParaRPr lang="en-US"/>
+          </a:p>
+        </p:txBody>
+      </p:sp>
+    </p:spTree>
+    <p:extLst>
+      <p:ext uri="{BB962C8B-B14F-4D97-AF65-F5344CB8AC3E}">
+        <p14:creationId xmlns:p14="http://schemas.microsoft.com/office/powerpoint/2010/main" val="845450670"/>
+      </p:ext>
+    </p:extLst>
+  </p:cSld>
+  <p:clrMapOvr>
+    <a:masterClrMapping/>
+  </p:clrMapOvr>
+</p:notes>
+</file>
+
+<file path=ppt/notesSlides/notesSlide2.xml><?xml version="1.0" encoding="utf-8"?>
+<p:notes xmlns:a="http://schemas.openxmlformats.org/drawingml/2006/main" xmlns:r="http://schemas.openxmlformats.org/officeDocument/2006/relationships" xmlns:p="http://schemas.openxmlformats.org/presentationml/2006/main">
+  <p:cSld>
+    <p:spTree>
+      <p:nvGrpSpPr>
+        <p:cNvPr id="1" name=""/>
+        <p:cNvGrpSpPr/>
+        <p:nvPr/>
+      </p:nvGrpSpPr>
+      <p:grpSpPr>
+        <a:xfrm>
+          <a:off x="0" y="0"/>
+          <a:ext cx="0" cy="0"/>
+          <a:chOff x="0" y="0"/>
+          <a:chExt cx="0" cy="0"/>
+        </a:xfrm>
+      </p:grpSpPr>
+      <p:sp>
+        <p:nvSpPr>
+          <p:cNvPr id="2" name="Slide Image Placeholder 1"/>
+          <p:cNvSpPr>
+            <a:spLocks noGrp="1" noRot="1" noChangeAspect="1"/>
+          </p:cNvSpPr>
+          <p:nvPr>
+            <p:ph type="sldImg"/>
+          </p:nvPr>
+        </p:nvSpPr>
+        <p:spPr/>
+      </p:sp>
+      <p:sp>
+        <p:nvSpPr>
+          <p:cNvPr id="3" name="Notes Placeholder 2"/>
+          <p:cNvSpPr>
+            <a:spLocks noGrp="1"/>
+          </p:cNvSpPr>
+          <p:nvPr>
+            <p:ph type="body" idx="1"/>
+          </p:nvPr>
+        </p:nvSpPr>
+        <p:spPr/>
+        <p:txBody>
+          <a:bodyPr/>
+          <a:lstStyle/>
+          <a:p>
+            <a:endParaRPr lang="en-US"/>
+          </a:p>
+        </p:txBody>
+      </p:sp>
+      <p:sp>
+        <p:nvSpPr>
+          <p:cNvPr id="4" name="Slide Number Placeholder 3"/>
+          <p:cNvSpPr>
+            <a:spLocks noGrp="1"/>
+          </p:cNvSpPr>
+          <p:nvPr>
+            <p:ph type="sldNum" sz="quarter" idx="5"/>
+          </p:nvPr>
+        </p:nvSpPr>
+        <p:spPr/>
+        <p:txBody>
+          <a:bodyPr/>
+          <a:lstStyle/>
+          <a:p>
+            <a:fld id="{9306DCE6-5E8C-4E63-B22B-AE2E83541C38}" type="slidenum">
+              <a:rPr lang="en-US" smtClean="0"/>
+              <a:t>4</a:t>
+            </a:fld>
+            <a:endParaRPr lang="en-US"/>
+          </a:p>
+        </p:txBody>
+      </p:sp>
+    </p:spTree>
+    <p:extLst>
+      <p:ext uri="{BB962C8B-B14F-4D97-AF65-F5344CB8AC3E}">
+        <p14:creationId xmlns:p14="http://schemas.microsoft.com/office/powerpoint/2010/main" val="855166197"/>
+      </p:ext>
+    </p:extLst>
+  </p:cSld>
+  <p:clrMapOvr>
+    <a:masterClrMapping/>
+  </p:clrMapOvr>
+</p:notes>
+</file>
+
+<file path=ppt/notesSlides/notesSlide3.xml><?xml version="1.0" encoding="utf-8"?>
+<p:notes xmlns:a="http://schemas.openxmlformats.org/drawingml/2006/main" xmlns:r="http://schemas.openxmlformats.org/officeDocument/2006/relationships" xmlns:p="http://schemas.openxmlformats.org/presentationml/2006/main">
+  <p:cSld>
+    <p:spTree>
+      <p:nvGrpSpPr>
+        <p:cNvPr id="1" name=""/>
+        <p:cNvGrpSpPr/>
+        <p:nvPr/>
+      </p:nvGrpSpPr>
+      <p:grpSpPr>
+        <a:xfrm>
+          <a:off x="0" y="0"/>
+          <a:ext cx="0" cy="0"/>
+          <a:chOff x="0" y="0"/>
+          <a:chExt cx="0" cy="0"/>
+        </a:xfrm>
+      </p:grpSpPr>
+      <p:sp>
+        <p:nvSpPr>
+          <p:cNvPr id="2" name="Slide Image Placeholder 1"/>
+          <p:cNvSpPr>
+            <a:spLocks noGrp="1" noRot="1" noChangeAspect="1"/>
+          </p:cNvSpPr>
+          <p:nvPr>
+            <p:ph type="sldImg"/>
+          </p:nvPr>
+        </p:nvSpPr>
+        <p:spPr/>
+      </p:sp>
+      <p:sp>
+        <p:nvSpPr>
+          <p:cNvPr id="3" name="Notes Placeholder 2"/>
+          <p:cNvSpPr>
+            <a:spLocks noGrp="1"/>
+          </p:cNvSpPr>
+          <p:nvPr>
+            <p:ph type="body" idx="1"/>
+          </p:nvPr>
+        </p:nvSpPr>
+        <p:spPr/>
+        <p:txBody>
+          <a:bodyPr/>
+          <a:lstStyle/>
+          <a:p>
             <a:r>
               <a:rPr lang="en-US" dirty="0" err="1"/>
               <a:t>coap:methodCode</a:t>
@@ -1238,7 +1406,7 @@
           <a:graphicData uri="http://schemas.openxmlformats.org/presentationml/2006/ole">
             <mc:AlternateContent xmlns:mc="http://schemas.openxmlformats.org/markup-compatibility/2006">
               <mc:Choice xmlns:v="urn:schemas-microsoft-com:vml" Requires="v">
-                <p:oleObj spid="_x0000_s1048" name="think-cell Folie" r:id="rId9" imgW="270" imgH="270" progId="">
+                <p:oleObj spid="_x0000_s1056" name="think-cell Folie" r:id="rId9" imgW="270" imgH="270" progId="">
                   <p:embed/>
                 </p:oleObj>
               </mc:Choice>
@@ -24312,22 +24480,34 @@
             <a:endParaRPr lang="en-US" sz="2100" dirty="0"/>
           </a:p>
           <a:p>
-            <a:pPr lvl="1"/>
-            <a:endParaRPr lang="en-US" dirty="0"/>
+            <a:pPr marL="360000" lvl="1" indent="0">
+              <a:buNone/>
+            </a:pPr>
+            <a:endParaRPr lang="en-US" sz="2100" dirty="0"/>
           </a:p>
           <a:p>
             <a:r>
-              <a:rPr lang="en-US" dirty="0"/>
-              <a:t>Implementations</a:t>
+              <a:rPr lang="en-US" sz="2900" dirty="0"/>
+              <a:t>Reference Implementation: node-wot</a:t>
             </a:r>
           </a:p>
           <a:p>
             <a:pPr lvl="1"/>
             <a:r>
-              <a:rPr lang="en-US" sz="2100" dirty="0">
+              <a:rPr lang="en-US" sz="2100" u="sng" dirty="0">
                 <a:hlinkClick r:id="rId19"/>
               </a:rPr>
-              <a:t>https://projects.eclipse.org/projects/iot.thingweb</a:t>
+              <a:t>https://github.com/eclipse/thingweb.node-wot</a:t>
+            </a:r>
+            <a:endParaRPr lang="en-US" sz="2100" dirty="0"/>
+          </a:p>
+          <a:p>
+            <a:endParaRPr lang="en-US" sz="2900" dirty="0"/>
+          </a:p>
+          <a:p>
+            <a:r>
+              <a:rPr lang="en-US" sz="2900" dirty="0"/>
+              <a:t>TAG Design Reviews</a:t>
             </a:r>
           </a:p>
           <a:p>
@@ -24336,35 +24516,15 @@
               <a:rPr lang="en-US" sz="2100" dirty="0">
                 <a:hlinkClick r:id="rId20"/>
               </a:rPr>
-              <a:t>https://github.com/thingweb/</a:t>
+              <a:t>https://github.com/w3ctag/design-reviews/issues/355</a:t>
             </a:r>
             <a:endParaRPr lang="en-US" sz="2100" dirty="0"/>
           </a:p>
           <a:p>
             <a:pPr lvl="1"/>
-            <a:endParaRPr lang="en-US" sz="2100" dirty="0"/>
-          </a:p>
-          <a:p>
-            <a:r>
-              <a:rPr lang="en-US" sz="2900" dirty="0"/>
-              <a:t>TAG Design Reviews</a:t>
-            </a:r>
-          </a:p>
-          <a:p>
-            <a:pPr lvl="1"/>
             <a:r>
               <a:rPr lang="en-US" sz="2100" dirty="0">
                 <a:hlinkClick r:id="rId21"/>
-              </a:rPr>
-              <a:t>https://github.com/w3ctag/design-reviews/issues/355</a:t>
-            </a:r>
-            <a:endParaRPr lang="en-US" sz="2100" dirty="0"/>
-          </a:p>
-          <a:p>
-            <a:pPr lvl="1"/>
-            <a:r>
-              <a:rPr lang="en-US" sz="2100" dirty="0">
-                <a:hlinkClick r:id="rId22"/>
               </a:rPr>
               <a:t>https://github.com/w3ctag/design-reviews/issues/357</a:t>
             </a:r>
@@ -24644,13 +24804,6 @@
             <a:br>
               <a:rPr lang="en-US" sz="1600" dirty="0"/>
             </a:br>
-            <a:r>
-              <a:rPr lang="en-US" sz="1600" dirty="0"/>
-              <a:t>Co-chairs: Siemens AG, Huawei</a:t>
-            </a:r>
-          </a:p>
-          <a:p>
-            <a:pPr lvl="1"/>
             <a:endParaRPr lang="en-US" sz="1600" dirty="0"/>
           </a:p>
           <a:p>
@@ -24671,7 +24824,7 @@
             <a:pPr lvl="1"/>
             <a:r>
               <a:rPr lang="en-US" dirty="0"/>
-              <a:t>Informal work, outreach</a:t>
+              <a:t>Informal work and outreach</a:t>
             </a:r>
           </a:p>
           <a:p>
@@ -24682,7 +24835,7 @@
             </a:r>
             <a:r>
               <a:rPr lang="en-US" dirty="0" err="1"/>
-              <a:t>PlugFests</a:t>
+              <a:t>PlugFest</a:t>
             </a:r>
             <a:r>
               <a:rPr lang="en-US" dirty="0"/>
@@ -24773,13 +24926,7 @@
               </a:rPr>
               <a:t>https://www.w3.org/2016/12/wot-wg-2016.html</a:t>
             </a:r>
-            <a:br>
-              <a:rPr lang="en-US" sz="1600" dirty="0"/>
-            </a:br>
-            <a:r>
-              <a:rPr lang="en-US" sz="1600" dirty="0"/>
-              <a:t>Co-chairs: Siemens AG/Huawei, Panasonic Corp., Intel Corp.</a:t>
-            </a:r>
+            <a:endParaRPr lang="en-US" dirty="0"/>
           </a:p>
           <a:p>
             <a:pPr lvl="1"/>
@@ -25097,7 +25244,7 @@
                                         <p:tgtEl>
                                           <p:spTgt spid="3">
                                             <p:txEl>
-                                              <p:pRg st="2" end="2"/>
+                                              <p:pRg st="1" end="1"/>
                                             </p:txEl>
                                           </p:spTgt>
                                         </p:tgtEl>
@@ -25115,7 +25262,7 @@
                                         <p:tgtEl>
                                           <p:spTgt spid="3">
                                             <p:txEl>
-                                              <p:pRg st="2" end="2"/>
+                                              <p:pRg st="1" end="1"/>
                                             </p:txEl>
                                           </p:spTgt>
                                         </p:tgtEl>
@@ -25140,7 +25287,7 @@
                                         <p:tgtEl>
                                           <p:spTgt spid="3">
                                             <p:txEl>
-                                              <p:pRg st="3" end="3"/>
+                                              <p:pRg st="2" end="2"/>
                                             </p:txEl>
                                           </p:spTgt>
                                         </p:tgtEl>
@@ -25158,7 +25305,7 @@
                                         <p:tgtEl>
                                           <p:spTgt spid="3">
                                             <p:txEl>
-                                              <p:pRg st="3" end="3"/>
+                                              <p:pRg st="2" end="2"/>
                                             </p:txEl>
                                           </p:spTgt>
                                         </p:tgtEl>
@@ -25183,7 +25330,7 @@
                                         <p:tgtEl>
                                           <p:spTgt spid="3">
                                             <p:txEl>
-                                              <p:pRg st="4" end="4"/>
+                                              <p:pRg st="3" end="3"/>
                                             </p:txEl>
                                           </p:spTgt>
                                         </p:tgtEl>
@@ -25201,7 +25348,7 @@
                                         <p:tgtEl>
                                           <p:spTgt spid="3">
                                             <p:txEl>
-                                              <p:pRg st="4" end="4"/>
+                                              <p:pRg st="3" end="3"/>
                                             </p:txEl>
                                           </p:spTgt>
                                         </p:tgtEl>
@@ -25226,7 +25373,7 @@
                                         <p:tgtEl>
                                           <p:spTgt spid="3">
                                             <p:txEl>
-                                              <p:pRg st="5" end="5"/>
+                                              <p:pRg st="4" end="4"/>
                                             </p:txEl>
                                           </p:spTgt>
                                         </p:tgtEl>
@@ -25244,7 +25391,7 @@
                                         <p:tgtEl>
                                           <p:spTgt spid="3">
                                             <p:txEl>
-                                              <p:pRg st="5" end="5"/>
+                                              <p:pRg st="4" end="4"/>
                                             </p:txEl>
                                           </p:spTgt>
                                         </p:tgtEl>
@@ -25269,7 +25416,7 @@
                                         <p:tgtEl>
                                           <p:spTgt spid="3">
                                             <p:txEl>
-                                              <p:pRg st="6" end="6"/>
+                                              <p:pRg st="5" end="5"/>
                                             </p:txEl>
                                           </p:spTgt>
                                         </p:tgtEl>
@@ -25287,7 +25434,7 @@
                                         <p:tgtEl>
                                           <p:spTgt spid="3">
                                             <p:txEl>
-                                              <p:pRg st="6" end="6"/>
+                                              <p:pRg st="5" end="5"/>
                                             </p:txEl>
                                           </p:spTgt>
                                         </p:tgtEl>
@@ -25312,7 +25459,7 @@
                                         <p:tgtEl>
                                           <p:spTgt spid="3">
                                             <p:txEl>
-                                              <p:pRg st="7" end="7"/>
+                                              <p:pRg st="6" end="6"/>
                                             </p:txEl>
                                           </p:spTgt>
                                         </p:tgtEl>
@@ -25330,7 +25477,7 @@
                                         <p:tgtEl>
                                           <p:spTgt spid="3">
                                             <p:txEl>
-                                              <p:pRg st="7" end="7"/>
+                                              <p:pRg st="6" end="6"/>
                                             </p:txEl>
                                           </p:spTgt>
                                         </p:tgtEl>
@@ -25355,7 +25502,7 @@
                                         <p:tgtEl>
                                           <p:spTgt spid="3">
                                             <p:txEl>
-                                              <p:pRg st="8" end="8"/>
+                                              <p:pRg st="7" end="7"/>
                                             </p:txEl>
                                           </p:spTgt>
                                         </p:tgtEl>
@@ -25373,7 +25520,7 @@
                                         <p:tgtEl>
                                           <p:spTgt spid="3">
                                             <p:txEl>
-                                              <p:pRg st="8" end="8"/>
+                                              <p:pRg st="7" end="7"/>
                                             </p:txEl>
                                           </p:spTgt>
                                         </p:tgtEl>
@@ -25398,7 +25545,7 @@
                                         <p:tgtEl>
                                           <p:spTgt spid="3">
                                             <p:txEl>
-                                              <p:pRg st="10" end="10"/>
+                                              <p:pRg st="9" end="9"/>
                                             </p:txEl>
                                           </p:spTgt>
                                         </p:tgtEl>
@@ -25416,7 +25563,7 @@
                                         <p:tgtEl>
                                           <p:spTgt spid="3">
                                             <p:txEl>
-                                              <p:pRg st="10" end="10"/>
+                                              <p:pRg st="9" end="9"/>
                                             </p:txEl>
                                           </p:spTgt>
                                         </p:tgtEl>
@@ -25965,7 +26112,7 @@
               <p:nvPr/>
             </p:nvPicPr>
             <p:blipFill rotWithShape="1">
-              <a:blip r:embed="rId39" cstate="screen">
+              <a:blip r:embed="rId40" cstate="screen">
                 <a:extLst>
                   <a:ext uri="{28A0092B-C50C-407E-A947-70E740481C1C}">
                     <a14:useLocalDpi xmlns:a14="http://schemas.microsoft.com/office/drawing/2010/main"/>
@@ -27768,7 +27915,7 @@
               <p:nvPr/>
             </p:nvPicPr>
             <p:blipFill rotWithShape="1">
-              <a:blip r:embed="rId39" cstate="screen">
+              <a:blip r:embed="rId40" cstate="screen">
                 <a:extLst>
                   <a:ext uri="{28A0092B-C50C-407E-A947-70E740481C1C}">
                     <a14:useLocalDpi xmlns:a14="http://schemas.microsoft.com/office/drawing/2010/main"/>
@@ -29109,7 +29256,7 @@
               <p:nvPr/>
             </p:nvPicPr>
             <p:blipFill rotWithShape="1">
-              <a:blip r:embed="rId39" cstate="screen">
+              <a:blip r:embed="rId40" cstate="screen">
                 <a:extLst>
                   <a:ext uri="{28A0092B-C50C-407E-A947-70E740481C1C}">
                     <a14:useLocalDpi xmlns:a14="http://schemas.microsoft.com/office/drawing/2010/main"/>
@@ -31428,11 +31575,11 @@
   <p:clrMapOvr>
     <a:masterClrMapping/>
   </p:clrMapOvr>
-  <mc:AlternateContent xmlns:mc="http://schemas.openxmlformats.org/markup-compatibility/2006">
-    <mc:Choice xmlns:p14="http://schemas.microsoft.com/office/powerpoint/2010/main" Requires="p14">
+  <mc:AlternateContent xmlns:mc="http://schemas.openxmlformats.org/markup-compatibility/2006" xmlns:p14="http://schemas.microsoft.com/office/powerpoint/2010/main">
+    <mc:Choice Requires="p14">
       <p:transition p14:dur="0"/>
     </mc:Choice>
-    <mc:Fallback>
+    <mc:Fallback xmlns="">
       <p:transition/>
     </mc:Fallback>
   </mc:AlternateContent>
@@ -32298,7 +32445,7 @@
               <a:r>
                 <a:rPr lang="en-US" sz="2000" dirty="0">
                   <a:solidFill>
-                    <a:prstClr val="white"/>
+                    <a:schemeClr val="tx1"/>
                   </a:solidFill>
                   <a:effectLst>
                     <a:outerShdw blurRad="38100" dist="38100" dir="2700000" algn="tl">
@@ -32307,7 +32454,7 @@
                       </a:srgbClr>
                     </a:outerShdw>
                   </a:effectLst>
-                  <a:latin typeface="Intel Clear Pro"/>
+                  <a:latin typeface="+mj-lt"/>
                   <a:cs typeface="Arial" charset="0"/>
                 </a:rPr>
                 <a:t>SEMANTIC ANNOTATION</a:t>
@@ -32412,10 +32559,10 @@
                       </a:srgbClr>
                     </a:outerShdw>
                   </a:effectLst>
-                  <a:latin typeface="Intel Clear Pro"/>
+                  <a:latin typeface="+mj-lt"/>
                   <a:cs typeface="Arial" charset="0"/>
                 </a:rPr>
-                <a:t>Interaction Affordances</a:t>
+                <a:t>INTERACTION AFFORDANCES</a:t>
               </a:r>
             </a:p>
           </p:txBody>
@@ -32517,7 +32664,7 @@
                       </a:srgbClr>
                     </a:outerShdw>
                   </a:effectLst>
-                  <a:latin typeface="Intel Clear Pro"/>
+                  <a:latin typeface="+mj-lt"/>
                   <a:cs typeface="Arial" charset="0"/>
                 </a:rPr>
                 <a:t>SECURITY SCHEME</a:t>
@@ -32622,7 +32769,7 @@
                       </a:srgbClr>
                     </a:outerShdw>
                   </a:effectLst>
-                  <a:latin typeface="Intel Clear Pro"/>
+                  <a:latin typeface="+mj-lt"/>
                   <a:cs typeface="Arial" charset="0"/>
                 </a:rPr>
                 <a:t>PROTOCOL BINDING</a:t>
@@ -32727,7 +32874,7 @@
                       </a:srgbClr>
                     </a:outerShdw>
                   </a:effectLst>
-                  <a:latin typeface="Intel Clear Pro"/>
+                  <a:latin typeface="+mj-lt"/>
                   <a:cs typeface="Arial" charset="0"/>
                 </a:rPr>
                 <a:t>PAYLOAD DATA SCHEMA</a:t>
@@ -34540,11 +34687,11 @@
   <p:clrMapOvr>
     <a:masterClrMapping/>
   </p:clrMapOvr>
-  <mc:AlternateContent xmlns:mc="http://schemas.openxmlformats.org/markup-compatibility/2006">
-    <mc:Choice xmlns:p14="http://schemas.microsoft.com/office/powerpoint/2010/main" Requires="p14">
+  <mc:AlternateContent xmlns:mc="http://schemas.openxmlformats.org/markup-compatibility/2006" xmlns:p14="http://schemas.microsoft.com/office/powerpoint/2010/main">
+    <mc:Choice Requires="p14">
       <p:transition p14:dur="0"/>
     </mc:Choice>
-    <mc:Fallback>
+    <mc:Fallback xmlns="">
       <p:transition/>
     </mc:Fallback>
   </mc:AlternateContent>
@@ -37697,7 +37844,7 @@
                 </a:solidFill>
                 <a:latin typeface="Consolas" panose="020B0609020204030204" pitchFamily="49" charset="0"/>
               </a:rPr>
-              <a:t>"oauth2</a:t>
+              <a:t>"basic</a:t>
             </a:r>
             <a:r>
               <a:rPr lang="de-DE" sz="1600" b="1" dirty="0">
@@ -37724,7 +37871,7 @@
                 </a:solidFill>
                 <a:latin typeface="Consolas" panose="020B0609020204030204" pitchFamily="49" charset="0"/>
               </a:rPr>
-              <a:t>:{</a:t>
+              <a:t>: {</a:t>
             </a:r>
             <a:endParaRPr lang="de-DE" sz="1600" dirty="0">
               <a:latin typeface="Consolas" panose="020B0609020204030204" pitchFamily="49" charset="0"/>
@@ -37778,7 +37925,7 @@
                 </a:solidFill>
                 <a:latin typeface="Consolas" panose="020B0609020204030204" pitchFamily="49" charset="0"/>
               </a:rPr>
-              <a:t>"oauth2"</a:t>
+              <a:t>"basic"</a:t>
             </a:r>
             <a:r>
               <a:rPr lang="de-DE" sz="1600" dirty="0">
@@ -37823,7 +37970,7 @@
                 </a:solidFill>
                 <a:latin typeface="Consolas" panose="020B0609020204030204" pitchFamily="49" charset="0"/>
               </a:rPr>
-              <a:t>"authenticationUrl"</a:t>
+              <a:t>"in"</a:t>
             </a:r>
             <a:r>
               <a:rPr lang="de-DE" sz="1600" dirty="0">
@@ -37841,7 +37988,7 @@
                 </a:solidFill>
                 <a:latin typeface="Consolas" panose="020B0609020204030204" pitchFamily="49" charset="0"/>
               </a:rPr>
-              <a:t>"https://authority-issuing.example.org"</a:t>
+              <a:t>"header"</a:t>
             </a:r>
           </a:p>
           <a:p>
@@ -41994,13 +42141,13 @@
         </p:nvSpPr>
         <p:spPr>
           <a:xfrm>
-            <a:off x="609918" y="980728"/>
-            <a:ext cx="10978515" cy="5688632"/>
+            <a:off x="609918" y="1052736"/>
+            <a:ext cx="10978515" cy="5616624"/>
           </a:xfrm>
         </p:spPr>
         <p:txBody>
           <a:bodyPr>
-            <a:normAutofit fontScale="92500"/>
+            <a:normAutofit lnSpcReduction="10000"/>
           </a:bodyPr>
           <a:lstStyle/>
           <a:p>
@@ -42035,33 +42182,41 @@
             <a:pPr lvl="1"/>
             <a:r>
               <a:rPr lang="en-US" dirty="0"/>
-              <a:t>Generally: more similarity to standard JSON practices</a:t>
+              <a:t>More similarity to standard JSON practices</a:t>
             </a:r>
           </a:p>
           <a:p>
             <a:r>
               <a:rPr lang="en-US" dirty="0"/>
-              <a:t>Depends on specific features being adopted into JSON-LD 1.1</a:t>
+              <a:t>Security metadata</a:t>
             </a:r>
           </a:p>
           <a:p>
             <a:pPr lvl="1"/>
             <a:r>
               <a:rPr lang="en-US" dirty="0"/>
-              <a:t>Will be working with JSON-LD 1.1 WG to keep standards in alignment</a:t>
+              <a:t>Focus on HTTP(S), </a:t>
+            </a:r>
+            <a:r>
+              <a:rPr lang="en-US" dirty="0" err="1"/>
+              <a:t>CoAP</a:t>
+            </a:r>
+            <a:r>
+              <a:rPr lang="en-US" dirty="0"/>
+              <a:t>(S), and MQTT(S)</a:t>
             </a:r>
           </a:p>
           <a:p>
             <a:r>
               <a:rPr lang="en-US" dirty="0"/>
-              <a:t>Security metadata</a:t>
+              <a:t>Protocol Bindings</a:t>
             </a:r>
           </a:p>
           <a:p>
             <a:pPr lvl="1"/>
             <a:r>
               <a:rPr lang="en-US" dirty="0"/>
-              <a:t>Focus on HTTP(S), </a:t>
+              <a:t>Focus on HTTP, </a:t>
             </a:r>
             <a:r>
               <a:rPr lang="en-US" dirty="0" err="1"/>
@@ -42069,51 +42224,36 @@
             </a:r>
             <a:r>
               <a:rPr lang="en-US" dirty="0"/>
-              <a:t>(S), and MQTT(S)</a:t>
-            </a:r>
-          </a:p>
-          <a:p>
-            <a:r>
-              <a:rPr lang="en-US" dirty="0"/>
-              <a:t>Protocol Bindings</a:t>
+              <a:t>, and MQTT and structured payloads compatible with JSON</a:t>
             </a:r>
           </a:p>
           <a:p>
             <a:pPr lvl="1"/>
             <a:r>
               <a:rPr lang="en-US" dirty="0"/>
-              <a:t>Focus on HTTP, </a:t>
+              <a:t>Support for Observe, using </a:t>
             </a:r>
             <a:r>
               <a:rPr lang="en-US" dirty="0" err="1"/>
-              <a:t>CoAP</a:t>
+              <a:t>subProtocols</a:t>
             </a:r>
             <a:r>
               <a:rPr lang="en-US" dirty="0"/>
-              <a:t>, and MQTT and structured payloads compatible with JSON</a:t>
+              <a:t> (</a:t>
+            </a:r>
+            <a:r>
+              <a:rPr lang="en-US" dirty="0" err="1"/>
+              <a:t>eg</a:t>
+            </a:r>
+            <a:r>
+              <a:rPr lang="en-US" dirty="0"/>
+              <a:t> long polling in HTTP) when appropriate</a:t>
             </a:r>
           </a:p>
           <a:p>
-            <a:pPr lvl="1"/>
-            <a:r>
-              <a:rPr lang="en-US" dirty="0"/>
-              <a:t>Support for Observe, using </a:t>
-            </a:r>
-            <a:r>
-              <a:rPr lang="en-US" dirty="0" err="1"/>
-              <a:t>subProtocols</a:t>
-            </a:r>
-            <a:r>
-              <a:rPr lang="en-US" dirty="0"/>
-              <a:t> (</a:t>
-            </a:r>
-            <a:r>
-              <a:rPr lang="en-US" dirty="0" err="1"/>
-              <a:t>eg</a:t>
-            </a:r>
-            <a:r>
-              <a:rPr lang="en-US" dirty="0"/>
-              <a:t> long polling in HTTP) when appropriate</a:t>
+            <a:r>
+              <a:rPr lang="en-US" b="1" i="1" dirty="0"/>
+              <a:t>Architecture and Thing Description submitted to TAG Review 26 March 2019</a:t>
             </a:r>
           </a:p>
           <a:p>
@@ -42123,10 +42263,10 @@
             </a:r>
           </a:p>
           <a:p>
-            <a:r>
-              <a:rPr lang="en-US" b="1" i="1" dirty="0"/>
-              <a:t>Architecture and Thing Description submitted to TAG Review 26 March 2019</a:t>
-            </a:r>
+            <a:pPr marL="0" indent="0">
+              <a:buNone/>
+            </a:pPr>
+            <a:endParaRPr lang="en-US" b="1" i="1" dirty="0"/>
           </a:p>
           <a:p>
             <a:endParaRPr lang="en-US" dirty="0"/>

</xml_diff>

<commit_message>
Minor typo fix, PDF version of WoT summary pres
</commit_message>
<xml_diff>
--- a/PRESENTATIONS/wot-summary-and-roadmap-04-2019.pptx
+++ b/PRESENTATIONS/wot-summary-and-roadmap-04-2019.pptx
@@ -224,7 +224,7 @@
           <a:p>
             <a:fld id="{44A134F2-1676-48A3-903A-038A6077AAEC}" type="datetimeFigureOut">
               <a:rPr lang="en-US" smtClean="0"/>
-              <a:t>4/7/2019</a:t>
+              <a:t>4/8/2019</a:t>
             </a:fld>
             <a:endParaRPr lang="en-US"/>
           </a:p>
@@ -953,7 +953,7 @@
           <a:p>
             <a:fld id="{26CC6D46-8883-4C59-8F41-21D7EAD29FB2}" type="datetimeFigureOut">
               <a:rPr lang="en-US" smtClean="0"/>
-              <a:t>4/7/2019</a:t>
+              <a:t>4/8/2019</a:t>
             </a:fld>
             <a:endParaRPr lang="en-US"/>
           </a:p>
@@ -1123,7 +1123,7 @@
           <a:p>
             <a:fld id="{26CC6D46-8883-4C59-8F41-21D7EAD29FB2}" type="datetimeFigureOut">
               <a:rPr lang="en-US" smtClean="0"/>
-              <a:t>4/7/2019</a:t>
+              <a:t>4/8/2019</a:t>
             </a:fld>
             <a:endParaRPr lang="en-US"/>
           </a:p>
@@ -1303,7 +1303,7 @@
           <a:p>
             <a:fld id="{26CC6D46-8883-4C59-8F41-21D7EAD29FB2}" type="datetimeFigureOut">
               <a:rPr lang="en-US" smtClean="0"/>
-              <a:t>4/7/2019</a:t>
+              <a:t>4/8/2019</a:t>
             </a:fld>
             <a:endParaRPr lang="en-US"/>
           </a:p>
@@ -1406,7 +1406,7 @@
           <a:graphicData uri="http://schemas.openxmlformats.org/presentationml/2006/ole">
             <mc:AlternateContent xmlns:mc="http://schemas.openxmlformats.org/markup-compatibility/2006">
               <mc:Choice xmlns:v="urn:schemas-microsoft-com:vml" Requires="v">
-                <p:oleObj spid="_x0000_s1056" name="think-cell Folie" r:id="rId9" imgW="270" imgH="270" progId="">
+                <p:oleObj spid="_x0000_s1065" name="think-cell Folie" r:id="rId9" imgW="270" imgH="270" progId="">
                   <p:embed/>
                 </p:oleObj>
               </mc:Choice>
@@ -20210,7 +20210,7 @@
           <a:p>
             <a:fld id="{26CC6D46-8883-4C59-8F41-21D7EAD29FB2}" type="datetimeFigureOut">
               <a:rPr lang="en-US" smtClean="0"/>
-              <a:t>4/7/2019</a:t>
+              <a:t>4/8/2019</a:t>
             </a:fld>
             <a:endParaRPr lang="en-US"/>
           </a:p>
@@ -20456,7 +20456,7 @@
           <a:p>
             <a:fld id="{26CC6D46-8883-4C59-8F41-21D7EAD29FB2}" type="datetimeFigureOut">
               <a:rPr lang="en-US" smtClean="0"/>
-              <a:t>4/7/2019</a:t>
+              <a:t>4/8/2019</a:t>
             </a:fld>
             <a:endParaRPr lang="en-US"/>
           </a:p>
@@ -20748,7 +20748,7 @@
           <a:p>
             <a:fld id="{26CC6D46-8883-4C59-8F41-21D7EAD29FB2}" type="datetimeFigureOut">
               <a:rPr lang="en-US" smtClean="0"/>
-              <a:t>4/7/2019</a:t>
+              <a:t>4/8/2019</a:t>
             </a:fld>
             <a:endParaRPr lang="en-US"/>
           </a:p>
@@ -21174,7 +21174,7 @@
           <a:p>
             <a:fld id="{26CC6D46-8883-4C59-8F41-21D7EAD29FB2}" type="datetimeFigureOut">
               <a:rPr lang="en-US" smtClean="0"/>
-              <a:t>4/7/2019</a:t>
+              <a:t>4/8/2019</a:t>
             </a:fld>
             <a:endParaRPr lang="en-US"/>
           </a:p>
@@ -21292,7 +21292,7 @@
           <a:p>
             <a:fld id="{26CC6D46-8883-4C59-8F41-21D7EAD29FB2}" type="datetimeFigureOut">
               <a:rPr lang="en-US" smtClean="0"/>
-              <a:t>4/7/2019</a:t>
+              <a:t>4/8/2019</a:t>
             </a:fld>
             <a:endParaRPr lang="en-US"/>
           </a:p>
@@ -21387,7 +21387,7 @@
           <a:p>
             <a:fld id="{26CC6D46-8883-4C59-8F41-21D7EAD29FB2}" type="datetimeFigureOut">
               <a:rPr lang="en-US" smtClean="0"/>
-              <a:t>4/7/2019</a:t>
+              <a:t>4/8/2019</a:t>
             </a:fld>
             <a:endParaRPr lang="en-US"/>
           </a:p>
@@ -21666,7 +21666,7 @@
           <a:p>
             <a:fld id="{26CC6D46-8883-4C59-8F41-21D7EAD29FB2}" type="datetimeFigureOut">
               <a:rPr lang="en-US" smtClean="0"/>
-              <a:t>4/7/2019</a:t>
+              <a:t>4/8/2019</a:t>
             </a:fld>
             <a:endParaRPr lang="en-US"/>
           </a:p>
@@ -21919,7 +21919,7 @@
           <a:p>
             <a:fld id="{26CC6D46-8883-4C59-8F41-21D7EAD29FB2}" type="datetimeFigureOut">
               <a:rPr lang="en-US" smtClean="0"/>
-              <a:t>4/7/2019</a:t>
+              <a:t>4/8/2019</a:t>
             </a:fld>
             <a:endParaRPr lang="en-US"/>
           </a:p>
@@ -22132,7 +22132,7 @@
           <a:p>
             <a:fld id="{26CC6D46-8883-4C59-8F41-21D7EAD29FB2}" type="datetimeFigureOut">
               <a:rPr lang="en-US" smtClean="0"/>
-              <a:t>4/7/2019</a:t>
+              <a:t>4/8/2019</a:t>
             </a:fld>
             <a:endParaRPr lang="en-US"/>
           </a:p>
@@ -22641,7 +22641,7 @@
             <a:fld id="{1A337C23-E3EE-4DE1-9498-0ACEDE885A4A}" type="datetimeFigureOut">
               <a:rPr lang="de-DE" smtClean="0"/>
               <a:pPr/>
-              <a:t>07.04.2019</a:t>
+              <a:t>08.04.2019</a:t>
             </a:fld>
             <a:endParaRPr lang="de-DE"/>
           </a:p>
@@ -24048,7 +24048,7 @@
           <a:p>
             <a:r>
               <a:rPr lang="en-US" dirty="0"/>
-              <a:t>By Describing and Complementing</a:t>
+              <a:t>By describing and complementing</a:t>
             </a:r>
           </a:p>
           <a:p>

</xml_diff>

<commit_message>
fix oauth2 -> basic typo
</commit_message>
<xml_diff>
--- a/PRESENTATIONS/wot-summary-and-roadmap-04-2019.pptx
+++ b/PRESENTATIONS/wot-summary-and-roadmap-04-2019.pptx
@@ -1406,7 +1406,7 @@
           <a:graphicData uri="http://schemas.openxmlformats.org/presentationml/2006/ole">
             <mc:AlternateContent xmlns:mc="http://schemas.openxmlformats.org/markup-compatibility/2006">
               <mc:Choice xmlns:v="urn:schemas-microsoft-com:vml" Requires="v">
-                <p:oleObj spid="_x0000_s1065" name="think-cell Folie" r:id="rId9" imgW="270" imgH="270" progId="">
+                <p:oleObj spid="_x0000_s1066" name="think-cell Folie" r:id="rId9" imgW="270" imgH="270" progId="">
                   <p:embed/>
                 </p:oleObj>
               </mc:Choice>
@@ -38032,10 +38032,19 @@
                 </a:solidFill>
                 <a:latin typeface="Consolas" panose="020B0609020204030204" pitchFamily="49" charset="0"/>
               </a:rPr>
-              <a:t>  "security"</a:t>
-            </a:r>
-            <a:r>
-              <a:rPr lang="de-DE" sz="1600" dirty="0">
+              <a:t>  "security</a:t>
+            </a:r>
+            <a:r>
+              <a:rPr lang="de-DE" sz="1600" b="1">
+                <a:solidFill>
+                  <a:srgbClr val="4A7B7C"/>
+                </a:solidFill>
+                <a:latin typeface="Consolas" panose="020B0609020204030204" pitchFamily="49" charset="0"/>
+              </a:rPr>
+              <a:t>"</a:t>
+            </a:r>
+            <a:r>
+              <a:rPr lang="de-DE" sz="1600">
                 <a:solidFill>
                   <a:srgbClr val="000000"/>
                 </a:solidFill>
@@ -38044,13 +38053,22 @@
               <a:t>: [</a:t>
             </a:r>
             <a:r>
-              <a:rPr lang="de-DE" sz="1600" dirty="0">
+              <a:rPr lang="de-DE" sz="1600">
                 <a:solidFill>
                   <a:srgbClr val="4A7B7C"/>
                 </a:solidFill>
                 <a:latin typeface="Consolas" panose="020B0609020204030204" pitchFamily="49" charset="0"/>
               </a:rPr>
-              <a:t>"oauth2_sc"</a:t>
+              <a:t>"basic</a:t>
+            </a:r>
+            <a:r>
+              <a:rPr lang="de-DE" sz="1600" dirty="0">
+                <a:solidFill>
+                  <a:srgbClr val="4A7B7C"/>
+                </a:solidFill>
+                <a:latin typeface="Consolas" panose="020B0609020204030204" pitchFamily="49" charset="0"/>
+              </a:rPr>
+              <a:t>_sc"</a:t>
             </a:r>
             <a:r>
               <a:rPr lang="de-DE" sz="1600" dirty="0">

</xml_diff>